<commit_message>
slides seem more done-ish
</commit_message>
<xml_diff>
--- a/present/AISTATS-2022/one-true-loss.pptx
+++ b/present/AISTATS-2022/one-true-loss.pptx
@@ -4120,6 +4120,36 @@
           <a:chExt cx="0" cy="0"/>
         </a:xfrm>
       </p:grpSpPr>
+      <p:pic>
+        <p:nvPicPr>
+          <p:cNvPr id="9228" name="Picture 9227">
+            <a:extLst>
+              <a:ext uri="{FF2B5EF4-FFF2-40B4-BE49-F238E27FC236}">
+                <a16:creationId xmlns:a16="http://schemas.microsoft.com/office/drawing/2014/main" id="{5563EC4A-43A5-4994-B4E5-D34A84780211}"/>
+              </a:ext>
+            </a:extLst>
+          </p:cNvPr>
+          <p:cNvPicPr>
+            <a:picLocks noChangeAspect="1"/>
+          </p:cNvPicPr>
+          <p:nvPr/>
+        </p:nvPicPr>
+        <p:blipFill>
+          <a:blip r:embed="rId2"/>
+          <a:stretch>
+            <a:fillRect/>
+          </a:stretch>
+        </p:blipFill>
+        <p:spPr>
+          <a:xfrm>
+            <a:off x="3332126" y="461512"/>
+            <a:ext cx="4812860" cy="1552714"/>
+          </a:xfrm>
+          <a:prstGeom prst="rect">
+            <a:avLst/>
+          </a:prstGeom>
+        </p:spPr>
+      </p:pic>
       <p:sp>
         <p:nvSpPr>
           <p:cNvPr id="2" name="Title 1">
@@ -4270,10 +4300,10 @@
         </p:nvGrpSpPr>
         <p:grpSpPr>
           <a:xfrm>
-            <a:off x="8658452" y="2433228"/>
-            <a:ext cx="2756730" cy="766813"/>
-            <a:chOff x="8541223" y="2389321"/>
-            <a:chExt cx="2756730" cy="766813"/>
+            <a:off x="8472343" y="2208802"/>
+            <a:ext cx="3499172" cy="914567"/>
+            <a:chOff x="8510743" y="2378255"/>
+            <a:chExt cx="3499172" cy="914567"/>
           </a:xfrm>
         </p:grpSpPr>
         <p:sp>
@@ -4290,8 +4320,8 @@
           </p:nvSpPr>
           <p:spPr>
             <a:xfrm>
-              <a:off x="10300564" y="2571359"/>
-              <a:ext cx="997389" cy="584775"/>
+              <a:off x="10400271" y="2708047"/>
+              <a:ext cx="1305165" cy="584775"/>
             </a:xfrm>
             <a:prstGeom prst="rect">
               <a:avLst/>
@@ -4311,7 +4341,7 @@
             <a:lstStyle/>
             <a:p>
               <a:r>
-                <a:rPr lang="en-US" sz="3200" b="1" cap="none" spc="0" dirty="0">
+                <a:rPr lang="en-US" sz="3200" b="1" cap="none" spc="600" dirty="0">
                   <a:ln w="0">
                     <a:noFill/>
                   </a:ln>
@@ -4341,8 +4371,8 @@
           </p:nvSpPr>
           <p:spPr>
             <a:xfrm>
-              <a:off x="9253804" y="2389321"/>
-              <a:ext cx="2044149" cy="584775"/>
+              <a:off x="9273268" y="2453063"/>
+              <a:ext cx="2736647" cy="584775"/>
             </a:xfrm>
             <a:prstGeom prst="rect">
               <a:avLst/>
@@ -4362,7 +4392,7 @@
             <a:lstStyle/>
             <a:p>
               <a:r>
-                <a:rPr lang="en-US" sz="3200" b="1" dirty="0">
+                <a:rPr lang="en-US" sz="3200" b="1" spc="600" dirty="0">
                   <a:ln w="0">
                     <a:noFill/>
                   </a:ln>
@@ -4392,8 +4422,8 @@
           </p:nvSpPr>
           <p:spPr>
             <a:xfrm>
-              <a:off x="8541223" y="2389321"/>
-              <a:ext cx="2108269" cy="584775"/>
+              <a:off x="8510743" y="2378255"/>
+              <a:ext cx="3031599" cy="584775"/>
             </a:xfrm>
             <a:prstGeom prst="rect">
               <a:avLst/>
@@ -4413,7 +4443,7 @@
             <a:lstStyle/>
             <a:p>
               <a:r>
-                <a:rPr lang="en-US" sz="3200" b="1" cap="none" spc="0" dirty="0">
+                <a:rPr lang="en-US" sz="3200" b="1" cap="none" spc="600" dirty="0">
                   <a:ln w="0">
                     <a:noFill/>
                   </a:ln>
@@ -4965,6 +4995,12 @@
               <a:avLst/>
             </a:prstGeom>
             <a:ln>
+              <a:solidFill>
+                <a:schemeClr val="tx1">
+                  <a:lumMod val="50000"/>
+                  <a:lumOff val="50000"/>
+                </a:schemeClr>
+              </a:solidFill>
               <a:tailEnd type="triangle"/>
             </a:ln>
           </p:spPr>
@@ -5009,6 +5045,12 @@
               </a:avLst>
             </a:prstGeom>
             <a:ln>
+              <a:solidFill>
+                <a:schemeClr val="tx1">
+                  <a:lumMod val="50000"/>
+                  <a:lumOff val="50000"/>
+                </a:schemeClr>
+              </a:solidFill>
               <a:tailEnd type="triangle"/>
             </a:ln>
           </p:spPr>
@@ -5115,36 +5157,6 @@
           </p:style>
         </p:cxnSp>
       </p:grpSp>
-      <p:pic>
-        <p:nvPicPr>
-          <p:cNvPr id="9228" name="Picture 9227">
-            <a:extLst>
-              <a:ext uri="{FF2B5EF4-FFF2-40B4-BE49-F238E27FC236}">
-                <a16:creationId xmlns:a16="http://schemas.microsoft.com/office/drawing/2014/main" id="{5563EC4A-43A5-4994-B4E5-D34A84780211}"/>
-              </a:ext>
-            </a:extLst>
-          </p:cNvPr>
-          <p:cNvPicPr>
-            <a:picLocks noChangeAspect="1"/>
-          </p:cNvPicPr>
-          <p:nvPr/>
-        </p:nvPicPr>
-        <p:blipFill>
-          <a:blip r:embed="rId2"/>
-          <a:stretch>
-            <a:fillRect/>
-          </a:stretch>
-        </p:blipFill>
-        <p:spPr>
-          <a:xfrm>
-            <a:off x="3332126" y="461512"/>
-            <a:ext cx="4812860" cy="1552714"/>
-          </a:xfrm>
-          <a:prstGeom prst="rect">
-            <a:avLst/>
-          </a:prstGeom>
-        </p:spPr>
-      </p:pic>
     </p:spTree>
     <p:extLst>
       <p:ext uri="{BB962C8B-B14F-4D97-AF65-F5344CB8AC3E}">
@@ -14975,7 +14987,7 @@
           <p:nvPr/>
         </p:nvPicPr>
         <p:blipFill rotWithShape="1">
-          <a:blip r:embed="rId3">
+          <a:blip r:embed="rId7">
             <a:clrChange>
               <a:clrFrom>
                 <a:srgbClr val="FFFFFF"/>
@@ -15020,7 +15032,7 @@
           <p:nvPr/>
         </p:nvPicPr>
         <p:blipFill rotWithShape="1">
-          <a:blip r:embed="rId7">
+          <a:blip r:embed="rId8">
             <a:clrChange>
               <a:clrFrom>
                 <a:srgbClr val="FFFFFF"/>
@@ -15065,7 +15077,7 @@
           <p:nvPr/>
         </p:nvPicPr>
         <p:blipFill>
-          <a:blip r:embed="rId8"/>
+          <a:blip r:embed="rId9"/>
           <a:stretch>
             <a:fillRect/>
           </a:stretch>
@@ -37015,10 +37027,10 @@
       </p:pic>
       <p:sp>
         <p:nvSpPr>
-          <p:cNvPr id="18" name="Content Placeholder 5">
+          <p:cNvPr id="7" name="Content Placeholder 5">
             <a:extLst>
               <a:ext uri="{FF2B5EF4-FFF2-40B4-BE49-F238E27FC236}">
-                <a16:creationId xmlns:a16="http://schemas.microsoft.com/office/drawing/2014/main" id="{F950C506-E2A8-49CA-9E93-F07708E9BA70}"/>
+                <a16:creationId xmlns:a16="http://schemas.microsoft.com/office/drawing/2014/main" id="{3B609D20-86A6-4C52-B431-4ABDE75DD5B1}"/>
               </a:ext>
             </a:extLst>
           </p:cNvPr>
@@ -37207,7 +37219,7 @@
           <a:p>
             <a:r>
               <a:rPr lang="en-US" dirty="0"/>
-              <a:t>Also known as “surprisal”, an expression of epistemic conflict</a:t>
+              <a:t>known as “surprisal”, an expression of epistemic conflict</a:t>
             </a:r>
           </a:p>
           <a:p>
@@ -37229,18 +37241,6 @@
   <p:clrMapOvr>
     <a:masterClrMapping/>
   </p:clrMapOvr>
-  <mc:AlternateContent xmlns:mc="http://schemas.openxmlformats.org/markup-compatibility/2006" xmlns:p159="http://schemas.microsoft.com/office/powerpoint/2015/09/main">
-    <mc:Choice Requires="p159">
-      <p:transition xmlns:p14="http://schemas.microsoft.com/office/powerpoint/2010/main" spd="slow" p14:dur="2000">
-        <p159:morph option="byObject"/>
-      </p:transition>
-    </mc:Choice>
-    <mc:Fallback xmlns="">
-      <p:transition spd="slow">
-        <p:fade/>
-      </p:transition>
-    </mc:Fallback>
-  </mc:AlternateContent>
   <p:timing>
     <p:tnLst>
       <p:par>
@@ -37320,7 +37320,7 @@
                                           </p:stCondLst>
                                         </p:cTn>
                                         <p:tgtEl>
-                                          <p:spTgt spid="18"/>
+                                          <p:spTgt spid="7"/>
                                         </p:tgtEl>
                                         <p:attrNameLst>
                                           <p:attrName>style.visibility</p:attrName>
@@ -37361,7 +37361,7 @@
       </p:par>
     </p:tnLst>
     <p:bldLst>
-      <p:bldP spid="18" grpId="0"/>
+      <p:bldP spid="7" grpId="0"/>
     </p:bldLst>
   </p:timing>
 </p:sld>
@@ -37406,7 +37406,7 @@
         </p:blipFill>
         <p:spPr>
           <a:xfrm>
-            <a:off x="2791844" y="3362198"/>
+            <a:off x="2925194" y="3495803"/>
             <a:ext cx="7196706" cy="1582434"/>
           </a:xfrm>
           <a:prstGeom prst="rect">
@@ -37524,7 +37524,7 @@
             </a:r>
             <a:r>
               <a:rPr lang="en-US" b="1" dirty="0"/>
-              <a:t> Information</a:t>
+              <a:t> Information Content</a:t>
             </a:r>
             <a:br>
               <a:rPr lang="en-US" b="1" dirty="0"/>
@@ -37546,8 +37546,8 @@
           </a:p>
         </p:txBody>
       </p:sp>
-      <mc:AlternateContent xmlns:mc="http://schemas.openxmlformats.org/markup-compatibility/2006" xmlns:a14="http://schemas.microsoft.com/office/drawing/2010/main">
-        <mc:Choice Requires="a14">
+      <mc:AlternateContent xmlns:mc="http://schemas.openxmlformats.org/markup-compatibility/2006">
+        <mc:Choice xmlns:a14="http://schemas.microsoft.com/office/drawing/2010/main" Requires="a14">
           <p:sp>
             <p:nvSpPr>
               <p:cNvPr id="20" name="Content Placeholder 5">
@@ -37578,15 +37578,7 @@
               <a:p>
                 <a:r>
                   <a:rPr lang="en-US" dirty="0"/>
-                  <a:t>Also works for  </a:t>
-                </a:r>
-                <a:r>
-                  <a:rPr lang="en-US" b="1" i="1" dirty="0"/>
-                  <a:t>joint</a:t>
-                </a:r>
-                <a:r>
-                  <a:rPr lang="en-US" dirty="0"/>
-                  <a:t>  distributions  </a:t>
+                  <a:t>Also works for joint distributions  </a:t>
                 </a:r>
                 <a14:m>
                   <m:oMath xmlns:m="http://schemas.openxmlformats.org/officeDocument/2006/math">
@@ -37625,11 +37617,34 @@
                         </m:r>
                       </m:e>
                     </m:d>
+                  </m:oMath>
+                </a14:m>
+                <a:r>
+                  <a:rPr lang="en-US" dirty="0"/>
+                  <a:t>,</a:t>
+                </a:r>
+                <a:br>
+                  <a:rPr lang="en-US" dirty="0"/>
+                </a:br>
+                <a:r>
+                  <a:rPr lang="en-US" dirty="0"/>
+                  <a:t>and </a:t>
+                </a:r>
+                <a:r>
+                  <a:rPr lang="en-US" i="1" dirty="0"/>
+                  <a:t>partial </a:t>
+                </a:r>
+                <a:r>
+                  <a:rPr lang="en-US" dirty="0"/>
+                  <a:t>observations </a:t>
+                </a:r>
+                <a14:m>
+                  <m:oMath xmlns:m="http://schemas.openxmlformats.org/officeDocument/2006/math">
                     <m:r>
-                      <a:rPr lang="en-US" b="0" i="1" dirty="0" smtClean="0">
+                      <a:rPr lang="en-US" b="0" i="1" smtClean="0">
                         <a:latin typeface="Cambria Math" panose="02040503050406030204" pitchFamily="18" charset="0"/>
                       </a:rPr>
-                      <m:t>.</m:t>
+                      <m:t>𝑥</m:t>
                     </m:r>
                   </m:oMath>
                 </a14:m>
@@ -37638,7 +37653,7 @@
             </p:txBody>
           </p:sp>
         </mc:Choice>
-        <mc:Fallback xmlns="">
+        <mc:Fallback>
           <p:sp>
             <p:nvSpPr>
               <p:cNvPr id="20" name="Content Placeholder 5">

</xml_diff>